<commit_message>
small edit adding time frame
</commit_message>
<xml_diff>
--- a/meetings-ietf/ietf-114/slides-114-alto-transport-07-26-working-07-25.pptx
+++ b/meetings-ietf/ietf-114/slides-114-alto-transport-07-26-working-07-25.pptx
@@ -582,10 +582,10 @@
           </a:ln>
           <a:extLst>
             <a:ext uri="{FAA26D3D-D897-4be2-8F04-BA451C77F1D7}">
-              <ma14:placeholderFlag xmlns="" xmlns:ma14="http://schemas.microsoft.com/office/mac/drawingml/2011/main" val="1"/>
+              <ma14:placeholderFlag xmlns:ma14="http://schemas.microsoft.com/office/mac/drawingml/2011/main" xmlns="" val="1"/>
             </a:ext>
             <a:ext uri="{909E8E84-426E-40dd-AFC4-6F175D3DCCD1}">
-              <a14:hiddenFill xmlns:a14="http://schemas.microsoft.com/office/drawing/2010/main" xmlns="">
+              <a14:hiddenFill xmlns="" xmlns:a14="http://schemas.microsoft.com/office/drawing/2010/main">
                 <a:solidFill>
                   <a:srgbClr val="FFFFFF"/>
                 </a:solidFill>
@@ -2883,17 +2883,17 @@
           </a:ln>
           <a:extLst>
             <a:ext uri="{FAA26D3D-D897-4be2-8F04-BA451C77F1D7}">
-              <ma14:placeholderFlag xmlns="" xmlns:ma14="http://schemas.microsoft.com/office/mac/drawingml/2011/main" val="1"/>
+              <ma14:placeholderFlag xmlns:ma14="http://schemas.microsoft.com/office/mac/drawingml/2011/main" xmlns="" val="1"/>
             </a:ext>
             <a:ext uri="{909E8E84-426E-40dd-AFC4-6F175D3DCCD1}">
-              <a14:hiddenFill xmlns:a14="http://schemas.microsoft.com/office/drawing/2010/main" xmlns="">
+              <a14:hiddenFill xmlns="" xmlns:a14="http://schemas.microsoft.com/office/drawing/2010/main">
                 <a:solidFill>
                   <a:srgbClr val="FFFFFF"/>
                 </a:solidFill>
               </a14:hiddenFill>
             </a:ext>
             <a:ext uri="{91240B29-F687-4f45-9708-019B960494DF}">
-              <a14:hiddenLine xmlns:a14="http://schemas.microsoft.com/office/drawing/2010/main" xmlns="" w="9525">
+              <a14:hiddenLine xmlns="" xmlns:a14="http://schemas.microsoft.com/office/drawing/2010/main" w="9525">
                 <a:solidFill>
                   <a:srgbClr val="000000"/>
                 </a:solidFill>
@@ -2975,7 +2975,7 @@
           </a:ln>
           <a:extLst>
             <a:ext uri="{909E8E84-426E-40dd-AFC4-6F175D3DCCD1}">
-              <a14:hiddenFill xmlns:a14="http://schemas.microsoft.com/office/drawing/2010/main" xmlns="">
+              <a14:hiddenFill xmlns="" xmlns:a14="http://schemas.microsoft.com/office/drawing/2010/main">
                 <a:noFill/>
               </a14:hiddenFill>
             </a:ext>
@@ -6070,7 +6070,7 @@
           <a:p>
             <a:r>
               <a:rPr lang="en-US" dirty="0"/>
-              <a:t>The authors will submit a new version as soon as the WG makes the decisions on Discuss 1-4</a:t>
+              <a:t>The authors will submit a new version as soon as the WG makes the decisions on Discuss 1-5 (by next week if possible)</a:t>
             </a:r>
           </a:p>
           <a:p>

</xml_diff>